<commit_message>
Screenshots + front polished
</commit_message>
<xml_diff>
--- a/docs/presentation_client.pptx
+++ b/docs/presentation_client.pptx
@@ -3092,7 +3092,7 @@
     <p:bg>
       <p:bgPr>
         <a:solidFill>
-          <a:srgbClr val="F0F4FC"/>
+          <a:srgbClr val="F7F4FB"/>
         </a:solidFill>
         <a:effectLst/>
       </p:bgPr>
@@ -3112,14 +3112,14 @@
         </p:nvSpPr>
         <p:spPr>
           <a:xfrm>
-            <a:off x="-91440" y="0"/>
-            <a:ext cx="9326880" cy="1188720"/>
+            <a:off x="0" y="0"/>
+            <a:ext cx="9144000" cy="1143000"/>
           </a:xfrm>
           <a:prstGeom prst="rect">
             <a:avLst/>
           </a:prstGeom>
           <a:solidFill>
-            <a:srgbClr val="06183A"/>
+            <a:srgbClr val="4B337D"/>
           </a:solidFill>
         </p:spPr>
         <p:style>
@@ -3152,14 +3152,14 @@
         </p:nvSpPr>
         <p:spPr>
           <a:xfrm>
-            <a:off x="-91440" y="1097280"/>
-            <a:ext cx="9326880" cy="320040"/>
+            <a:off x="0" y="1097280"/>
+            <a:ext cx="9144000" cy="292608"/>
           </a:xfrm>
           <a:prstGeom prst="rect">
             <a:avLst/>
           </a:prstGeom>
           <a:solidFill>
-            <a:srgbClr val="FF9843"/>
+            <a:srgbClr val="C4A2E7"/>
           </a:solidFill>
         </p:spPr>
         <p:style>
@@ -3193,7 +3193,7 @@
         <p:spPr>
           <a:xfrm>
             <a:off x="640080" y="1645920"/>
-            <a:ext cx="8046720" cy="4389120"/>
+            <a:ext cx="7863840" cy="4389120"/>
           </a:xfrm>
           <a:prstGeom prst="rect">
             <a:avLst/>
@@ -3203,7 +3203,7 @@
           </a:solidFill>
           <a:ln>
             <a:solidFill>
-              <a:srgbClr val="D2D9E6"/>
+              <a:srgbClr val="D6D0E0"/>
             </a:solidFill>
           </a:ln>
         </p:spPr>
@@ -3237,8 +3237,8 @@
         </p:nvSpPr>
         <p:spPr>
           <a:xfrm>
-            <a:off x="822960" y="228600"/>
-            <a:ext cx="7315200" cy="822960"/>
+            <a:off x="457200" y="228600"/>
+            <a:ext cx="6858000" cy="822960"/>
           </a:xfrm>
           <a:prstGeom prst="rect">
             <a:avLst/>
@@ -3272,7 +3272,7 @@
         </p:nvSpPr>
         <p:spPr>
           <a:xfrm>
-            <a:off x="822960" y="1097280"/>
+            <a:off x="457200" y="1078992"/>
             <a:ext cx="7315200" cy="457200"/>
           </a:xfrm>
           <a:prstGeom prst="rect">
@@ -3289,7 +3289,7 @@
             <a:pPr>
               <a:defRPr sz="2000">
                 <a:solidFill>
-                  <a:srgbClr val="FFFFFF"/>
+                  <a:srgbClr val="4B337D"/>
                 </a:solidFill>
               </a:defRPr>
             </a:pPr>
@@ -3307,8 +3307,85 @@
         </p:nvSpPr>
         <p:spPr>
           <a:xfrm>
-            <a:off x="1097280" y="1920240"/>
-            <a:ext cx="7132320" cy="3657600"/>
+            <a:off x="914400" y="1828800"/>
+            <a:ext cx="7223760" cy="4023360"/>
+          </a:xfrm>
+          <a:prstGeom prst="rect">
+            <a:avLst/>
+          </a:prstGeom>
+          <a:noFill/>
+        </p:spPr>
+        <p:txBody>
+          <a:bodyPr wrap="square" anchor="ctr">
+            <a:spAutoFit/>
+          </a:bodyPr>
+          <a:lstStyle/>
+          <a:p>
+            <a:pPr>
+              <a:lnSpc>
+                <a:spcPct val="120000"/>
+              </a:lnSpc>
+              <a:spcAft>
+                <a:spcPts val="1000"/>
+              </a:spcAft>
+              <a:defRPr sz="2000">
+                <a:solidFill>
+                  <a:srgbClr val="22182C"/>
+                </a:solidFill>
+              </a:defRPr>
+            </a:pPr>
+            <a:r>
+              <a:t>• Plateforme centralisée sur un serveur unique (front, API, base, scripts).</a:t>
+            </a:r>
+          </a:p>
+          <a:p>
+            <a:pPr>
+              <a:lnSpc>
+                <a:spcPct val="120000"/>
+              </a:lnSpc>
+              <a:spcAft>
+                <a:spcPts val="1000"/>
+              </a:spcAft>
+              <a:defRPr sz="2000">
+                <a:solidFill>
+                  <a:srgbClr val="22182C"/>
+                </a:solidFill>
+              </a:defRPr>
+            </a:pPr>
+            <a:r>
+              <a:t>• Incidents récents = indisponibilité totale et mises à jour périlleuses.</a:t>
+            </a:r>
+          </a:p>
+          <a:p>
+            <a:pPr>
+              <a:lnSpc>
+                <a:spcPct val="120000"/>
+              </a:lnSpc>
+              <a:spcAft>
+                <a:spcPts val="1000"/>
+              </a:spcAft>
+              <a:defRPr sz="2000">
+                <a:solidFill>
+                  <a:srgbClr val="22182C"/>
+                </a:solidFill>
+              </a:defRPr>
+            </a:pPr>
+            <a:r>
+              <a:t>• Le DSI veut un POC démontrant séparation des services et continuité.</a:t>
+            </a:r>
+          </a:p>
+        </p:txBody>
+      </p:sp>
+      <p:sp>
+        <p:nvSpPr>
+          <p:cNvPr id="8" name="TextBox 7"/>
+          <p:cNvSpPr txBox="1"/>
+          <p:nvPr/>
+        </p:nvSpPr>
+        <p:spPr>
+          <a:xfrm>
+            <a:off x="640080" y="5989320"/>
+            <a:ext cx="7955279" cy="320040"/>
           </a:xfrm>
           <a:prstGeom prst="rect">
             <a:avLst/>
@@ -3322,77 +3399,9 @@
           <a:lstStyle/>
           <a:p>
             <a:pPr>
-              <a:spcAft>
-                <a:spcPts val="1200"/>
-              </a:spcAft>
-              <a:defRPr sz="2200">
-                <a:solidFill>
-                  <a:srgbClr val="1E2228"/>
-                </a:solidFill>
-              </a:defRPr>
-            </a:pPr>
-            <a:r>
-              <a:t>• Plateforme centralisée sur un serveur unique (front, API, base, scripts).</a:t>
-            </a:r>
-          </a:p>
-          <a:p>
-            <a:pPr>
-              <a:spcAft>
-                <a:spcPts val="1200"/>
-              </a:spcAft>
-              <a:defRPr sz="2200">
-                <a:solidFill>
-                  <a:srgbClr val="1E2228"/>
-                </a:solidFill>
-              </a:defRPr>
-            </a:pPr>
-            <a:r>
-              <a:t>• Incidents récents = indisponibilité totale et mises à jour périlleuses.</a:t>
-            </a:r>
-          </a:p>
-          <a:p>
-            <a:pPr>
-              <a:spcAft>
-                <a:spcPts val="1200"/>
-              </a:spcAft>
-              <a:defRPr sz="2200">
-                <a:solidFill>
-                  <a:srgbClr val="1E2228"/>
-                </a:solidFill>
-              </a:defRPr>
-            </a:pPr>
-            <a:r>
-              <a:t>• Le DSI veut un POC démontrant séparation des services et continuité.</a:t>
-            </a:r>
-          </a:p>
-        </p:txBody>
-      </p:sp>
-      <p:sp>
-        <p:nvSpPr>
-          <p:cNvPr id="8" name="TextBox 7"/>
-          <p:cNvSpPr txBox="1"/>
-          <p:nvPr/>
-        </p:nvSpPr>
-        <p:spPr>
-          <a:xfrm>
-            <a:off x="640080" y="6080760"/>
-            <a:ext cx="8046720" cy="365760"/>
-          </a:xfrm>
-          <a:prstGeom prst="rect">
-            <a:avLst/>
-          </a:prstGeom>
-          <a:noFill/>
-        </p:spPr>
-        <p:txBody>
-          <a:bodyPr wrap="none">
-            <a:spAutoFit/>
-          </a:bodyPr>
-          <a:lstStyle/>
-          <a:p>
-            <a:pPr>
-              <a:defRPr sz="1400">
-                <a:solidFill>
-                  <a:srgbClr val="767C88"/>
+              <a:defRPr sz="1300">
+                <a:solidFill>
+                  <a:srgbClr val="82788C"/>
                 </a:solidFill>
               </a:defRPr>
             </a:pPr>
@@ -3416,7 +3425,7 @@
     <p:bg>
       <p:bgPr>
         <a:solidFill>
-          <a:srgbClr val="F0F4FC"/>
+          <a:srgbClr val="F7F4FB"/>
         </a:solidFill>
         <a:effectLst/>
       </p:bgPr>
@@ -3436,14 +3445,14 @@
         </p:nvSpPr>
         <p:spPr>
           <a:xfrm>
-            <a:off x="-91440" y="0"/>
-            <a:ext cx="9326880" cy="1188720"/>
+            <a:off x="0" y="0"/>
+            <a:ext cx="9144000" cy="1143000"/>
           </a:xfrm>
           <a:prstGeom prst="rect">
             <a:avLst/>
           </a:prstGeom>
           <a:solidFill>
-            <a:srgbClr val="06183A"/>
+            <a:srgbClr val="4B337D"/>
           </a:solidFill>
         </p:spPr>
         <p:style>
@@ -3476,14 +3485,14 @@
         </p:nvSpPr>
         <p:spPr>
           <a:xfrm>
-            <a:off x="-91440" y="1097280"/>
-            <a:ext cx="9326880" cy="320040"/>
+            <a:off x="0" y="1097280"/>
+            <a:ext cx="9144000" cy="292608"/>
           </a:xfrm>
           <a:prstGeom prst="rect">
             <a:avLst/>
           </a:prstGeom>
           <a:solidFill>
-            <a:srgbClr val="FF9843"/>
+            <a:srgbClr val="C4A2E7"/>
           </a:solidFill>
         </p:spPr>
         <p:style>
@@ -3517,7 +3526,7 @@
         <p:spPr>
           <a:xfrm>
             <a:off x="640080" y="1645920"/>
-            <a:ext cx="8046720" cy="4389120"/>
+            <a:ext cx="7863840" cy="4389120"/>
           </a:xfrm>
           <a:prstGeom prst="rect">
             <a:avLst/>
@@ -3527,7 +3536,7 @@
           </a:solidFill>
           <a:ln>
             <a:solidFill>
-              <a:srgbClr val="D2D9E6"/>
+              <a:srgbClr val="D6D0E0"/>
             </a:solidFill>
           </a:ln>
         </p:spPr>
@@ -3561,8 +3570,8 @@
         </p:nvSpPr>
         <p:spPr>
           <a:xfrm>
-            <a:off x="822960" y="228600"/>
-            <a:ext cx="7315200" cy="822960"/>
+            <a:off x="457200" y="228600"/>
+            <a:ext cx="6858000" cy="822960"/>
           </a:xfrm>
           <a:prstGeom prst="rect">
             <a:avLst/>
@@ -3596,7 +3605,7 @@
         </p:nvSpPr>
         <p:spPr>
           <a:xfrm>
-            <a:off x="822960" y="1097280"/>
+            <a:off x="457200" y="1078992"/>
             <a:ext cx="7315200" cy="457200"/>
           </a:xfrm>
           <a:prstGeom prst="rect">
@@ -3613,7 +3622,7 @@
             <a:pPr>
               <a:defRPr sz="2000">
                 <a:solidFill>
-                  <a:srgbClr val="FFFFFF"/>
+                  <a:srgbClr val="4B337D"/>
                 </a:solidFill>
               </a:defRPr>
             </a:pPr>
@@ -3631,8 +3640,85 @@
         </p:nvSpPr>
         <p:spPr>
           <a:xfrm>
-            <a:off x="1097280" y="1920240"/>
-            <a:ext cx="7132320" cy="3657600"/>
+            <a:off x="914400" y="1828800"/>
+            <a:ext cx="7223760" cy="4023360"/>
+          </a:xfrm>
+          <a:prstGeom prst="rect">
+            <a:avLst/>
+          </a:prstGeom>
+          <a:noFill/>
+        </p:spPr>
+        <p:txBody>
+          <a:bodyPr wrap="square" anchor="ctr">
+            <a:spAutoFit/>
+          </a:bodyPr>
+          <a:lstStyle/>
+          <a:p>
+            <a:pPr>
+              <a:lnSpc>
+                <a:spcPct val="120000"/>
+              </a:lnSpc>
+              <a:spcAft>
+                <a:spcPts val="1000"/>
+              </a:spcAft>
+              <a:defRPr sz="2000">
+                <a:solidFill>
+                  <a:srgbClr val="22182C"/>
+                </a:solidFill>
+              </a:defRPr>
+            </a:pPr>
+            <a:r>
+              <a:t>• Isoler front &amp; API pour fiabiliser la recette et préparer la scalabilité.</a:t>
+            </a:r>
+          </a:p>
+          <a:p>
+            <a:pPr>
+              <a:lnSpc>
+                <a:spcPct val="120000"/>
+              </a:lnSpc>
+              <a:spcAft>
+                <a:spcPts val="1000"/>
+              </a:spcAft>
+              <a:defRPr sz="2000">
+                <a:solidFill>
+                  <a:srgbClr val="22182C"/>
+                </a:solidFill>
+              </a:defRPr>
+            </a:pPr>
+            <a:r>
+              <a:t>• Mettre en œuvre Docker, Kubernetes et amorcer une chaîne CI/CD.</a:t>
+            </a:r>
+          </a:p>
+          <a:p>
+            <a:pPr>
+              <a:lnSpc>
+                <a:spcPct val="120000"/>
+              </a:lnSpc>
+              <a:spcAft>
+                <a:spcPts val="1000"/>
+              </a:spcAft>
+              <a:defRPr sz="2000">
+                <a:solidFill>
+                  <a:srgbClr val="22182C"/>
+                </a:solidFill>
+              </a:defRPr>
+            </a:pPr>
+            <a:r>
+              <a:t>• Livrer documentation et présentation facilitant la décision.</a:t>
+            </a:r>
+          </a:p>
+        </p:txBody>
+      </p:sp>
+      <p:sp>
+        <p:nvSpPr>
+          <p:cNvPr id="8" name="TextBox 7"/>
+          <p:cNvSpPr txBox="1"/>
+          <p:nvPr/>
+        </p:nvSpPr>
+        <p:spPr>
+          <a:xfrm>
+            <a:off x="640080" y="5989320"/>
+            <a:ext cx="7955279" cy="320040"/>
           </a:xfrm>
           <a:prstGeom prst="rect">
             <a:avLst/>
@@ -3646,77 +3732,9 @@
           <a:lstStyle/>
           <a:p>
             <a:pPr>
-              <a:spcAft>
-                <a:spcPts val="1200"/>
-              </a:spcAft>
-              <a:defRPr sz="2200">
-                <a:solidFill>
-                  <a:srgbClr val="1E2228"/>
-                </a:solidFill>
-              </a:defRPr>
-            </a:pPr>
-            <a:r>
-              <a:t>• Isoler front &amp; API pour fiabiliser la recette et préparer la scalabilité.</a:t>
-            </a:r>
-          </a:p>
-          <a:p>
-            <a:pPr>
-              <a:spcAft>
-                <a:spcPts val="1200"/>
-              </a:spcAft>
-              <a:defRPr sz="2200">
-                <a:solidFill>
-                  <a:srgbClr val="1E2228"/>
-                </a:solidFill>
-              </a:defRPr>
-            </a:pPr>
-            <a:r>
-              <a:t>• Mettre en œuvre Docker, Kubernetes et amorcer une chaîne CI/CD.</a:t>
-            </a:r>
-          </a:p>
-          <a:p>
-            <a:pPr>
-              <a:spcAft>
-                <a:spcPts val="1200"/>
-              </a:spcAft>
-              <a:defRPr sz="2200">
-                <a:solidFill>
-                  <a:srgbClr val="1E2228"/>
-                </a:solidFill>
-              </a:defRPr>
-            </a:pPr>
-            <a:r>
-              <a:t>• Livrer documentation et présentation facilitant la décision.</a:t>
-            </a:r>
-          </a:p>
-        </p:txBody>
-      </p:sp>
-      <p:sp>
-        <p:nvSpPr>
-          <p:cNvPr id="8" name="TextBox 7"/>
-          <p:cNvSpPr txBox="1"/>
-          <p:nvPr/>
-        </p:nvSpPr>
-        <p:spPr>
-          <a:xfrm>
-            <a:off x="640080" y="6080760"/>
-            <a:ext cx="8046720" cy="365760"/>
-          </a:xfrm>
-          <a:prstGeom prst="rect">
-            <a:avLst/>
-          </a:prstGeom>
-          <a:noFill/>
-        </p:spPr>
-        <p:txBody>
-          <a:bodyPr wrap="none">
-            <a:spAutoFit/>
-          </a:bodyPr>
-          <a:lstStyle/>
-          <a:p>
-            <a:pPr>
-              <a:defRPr sz="1400">
-                <a:solidFill>
-                  <a:srgbClr val="767C88"/>
+              <a:defRPr sz="1300">
+                <a:solidFill>
+                  <a:srgbClr val="82788C"/>
                 </a:solidFill>
               </a:defRPr>
             </a:pPr>
@@ -3740,7 +3758,7 @@
     <p:bg>
       <p:bgPr>
         <a:solidFill>
-          <a:srgbClr val="F0F4FC"/>
+          <a:srgbClr val="F7F4FB"/>
         </a:solidFill>
         <a:effectLst/>
       </p:bgPr>
@@ -3760,14 +3778,14 @@
         </p:nvSpPr>
         <p:spPr>
           <a:xfrm>
-            <a:off x="-91440" y="0"/>
-            <a:ext cx="9326880" cy="1188720"/>
+            <a:off x="0" y="0"/>
+            <a:ext cx="9144000" cy="1143000"/>
           </a:xfrm>
           <a:prstGeom prst="rect">
             <a:avLst/>
           </a:prstGeom>
           <a:solidFill>
-            <a:srgbClr val="06183A"/>
+            <a:srgbClr val="4B337D"/>
           </a:solidFill>
         </p:spPr>
         <p:style>
@@ -3800,14 +3818,14 @@
         </p:nvSpPr>
         <p:spPr>
           <a:xfrm>
-            <a:off x="-91440" y="1097280"/>
-            <a:ext cx="9326880" cy="320040"/>
+            <a:off x="0" y="1097280"/>
+            <a:ext cx="9144000" cy="292608"/>
           </a:xfrm>
           <a:prstGeom prst="rect">
             <a:avLst/>
           </a:prstGeom>
           <a:solidFill>
-            <a:srgbClr val="FF9843"/>
+            <a:srgbClr val="C4A2E7"/>
           </a:solidFill>
         </p:spPr>
         <p:style>
@@ -3841,7 +3859,7 @@
         <p:spPr>
           <a:xfrm>
             <a:off x="640080" y="1645920"/>
-            <a:ext cx="8046720" cy="4389120"/>
+            <a:ext cx="7863840" cy="4389120"/>
           </a:xfrm>
           <a:prstGeom prst="rect">
             <a:avLst/>
@@ -3851,7 +3869,7 @@
           </a:solidFill>
           <a:ln>
             <a:solidFill>
-              <a:srgbClr val="D2D9E6"/>
+              <a:srgbClr val="D6D0E0"/>
             </a:solidFill>
           </a:ln>
         </p:spPr>
@@ -3885,8 +3903,8 @@
         </p:nvSpPr>
         <p:spPr>
           <a:xfrm>
-            <a:off x="822960" y="228600"/>
-            <a:ext cx="7315200" cy="822960"/>
+            <a:off x="457200" y="228600"/>
+            <a:ext cx="6858000" cy="822960"/>
           </a:xfrm>
           <a:prstGeom prst="rect">
             <a:avLst/>
@@ -3920,7 +3938,7 @@
         </p:nvSpPr>
         <p:spPr>
           <a:xfrm>
-            <a:off x="822960" y="1097280"/>
+            <a:off x="457200" y="1078992"/>
             <a:ext cx="7315200" cy="457200"/>
           </a:xfrm>
           <a:prstGeom prst="rect">
@@ -3937,7 +3955,7 @@
             <a:pPr>
               <a:defRPr sz="2000">
                 <a:solidFill>
-                  <a:srgbClr val="FFFFFF"/>
+                  <a:srgbClr val="4B337D"/>
                 </a:solidFill>
               </a:defRPr>
             </a:pPr>
@@ -3955,8 +3973,85 @@
         </p:nvSpPr>
         <p:spPr>
           <a:xfrm>
-            <a:off x="1097280" y="1920240"/>
-            <a:ext cx="7132320" cy="3657600"/>
+            <a:off x="914400" y="1828800"/>
+            <a:ext cx="7223760" cy="4023360"/>
+          </a:xfrm>
+          <a:prstGeom prst="rect">
+            <a:avLst/>
+          </a:prstGeom>
+          <a:noFill/>
+        </p:spPr>
+        <p:txBody>
+          <a:bodyPr wrap="square" anchor="ctr">
+            <a:spAutoFit/>
+          </a:bodyPr>
+          <a:lstStyle/>
+          <a:p>
+            <a:pPr>
+              <a:lnSpc>
+                <a:spcPct val="120000"/>
+              </a:lnSpc>
+              <a:spcAft>
+                <a:spcPts val="1000"/>
+              </a:spcAft>
+              <a:defRPr sz="2000">
+                <a:solidFill>
+                  <a:srgbClr val="22182C"/>
+                </a:solidFill>
+              </a:defRPr>
+            </a:pPr>
+            <a:r>
+              <a:t>• Mode dev : Docker Compose, réseau dédié, variables injectées.</a:t>
+            </a:r>
+          </a:p>
+          <a:p>
+            <a:pPr>
+              <a:lnSpc>
+                <a:spcPct val="120000"/>
+              </a:lnSpc>
+              <a:spcAft>
+                <a:spcPts val="1000"/>
+              </a:spcAft>
+              <a:defRPr sz="2000">
+                <a:solidFill>
+                  <a:srgbClr val="22182C"/>
+                </a:solidFill>
+              </a:defRPr>
+            </a:pPr>
+            <a:r>
+              <a:t>• Mode recette : namespace Kubernetes, Deployments, Services, ConfigMap + Secret.</a:t>
+            </a:r>
+          </a:p>
+          <a:p>
+            <a:pPr>
+              <a:lnSpc>
+                <a:spcPct val="120000"/>
+              </a:lnSpc>
+              <a:spcAft>
+                <a:spcPts val="1000"/>
+              </a:spcAft>
+              <a:defRPr sz="2000">
+                <a:solidFill>
+                  <a:srgbClr val="22182C"/>
+                </a:solidFill>
+              </a:defRPr>
+            </a:pPr>
+            <a:r>
+              <a:t>• Interconnexions via DNS Kubernetes, front exposé en NodePort 30080.</a:t>
+            </a:r>
+          </a:p>
+        </p:txBody>
+      </p:sp>
+      <p:sp>
+        <p:nvSpPr>
+          <p:cNvPr id="8" name="TextBox 7"/>
+          <p:cNvSpPr txBox="1"/>
+          <p:nvPr/>
+        </p:nvSpPr>
+        <p:spPr>
+          <a:xfrm>
+            <a:off x="640080" y="5989320"/>
+            <a:ext cx="7955279" cy="320040"/>
           </a:xfrm>
           <a:prstGeom prst="rect">
             <a:avLst/>
@@ -3970,77 +4065,9 @@
           <a:lstStyle/>
           <a:p>
             <a:pPr>
-              <a:spcAft>
-                <a:spcPts val="1200"/>
-              </a:spcAft>
-              <a:defRPr sz="2200">
-                <a:solidFill>
-                  <a:srgbClr val="1E2228"/>
-                </a:solidFill>
-              </a:defRPr>
-            </a:pPr>
-            <a:r>
-              <a:t>• Mode dev : Docker Compose, réseau dédié, variables injectées.</a:t>
-            </a:r>
-          </a:p>
-          <a:p>
-            <a:pPr>
-              <a:spcAft>
-                <a:spcPts val="1200"/>
-              </a:spcAft>
-              <a:defRPr sz="2200">
-                <a:solidFill>
-                  <a:srgbClr val="1E2228"/>
-                </a:solidFill>
-              </a:defRPr>
-            </a:pPr>
-            <a:r>
-              <a:t>• Mode recette : namespace Kubernetes, Deployments, Services, ConfigMap + Secret.</a:t>
-            </a:r>
-          </a:p>
-          <a:p>
-            <a:pPr>
-              <a:spcAft>
-                <a:spcPts val="1200"/>
-              </a:spcAft>
-              <a:defRPr sz="2200">
-                <a:solidFill>
-                  <a:srgbClr val="1E2228"/>
-                </a:solidFill>
-              </a:defRPr>
-            </a:pPr>
-            <a:r>
-              <a:t>• Interconnexions via DNS Kubernetes, front exposé en NodePort 30080.</a:t>
-            </a:r>
-          </a:p>
-        </p:txBody>
-      </p:sp>
-      <p:sp>
-        <p:nvSpPr>
-          <p:cNvPr id="8" name="TextBox 7"/>
-          <p:cNvSpPr txBox="1"/>
-          <p:nvPr/>
-        </p:nvSpPr>
-        <p:spPr>
-          <a:xfrm>
-            <a:off x="640080" y="6080760"/>
-            <a:ext cx="8046720" cy="365760"/>
-          </a:xfrm>
-          <a:prstGeom prst="rect">
-            <a:avLst/>
-          </a:prstGeom>
-          <a:noFill/>
-        </p:spPr>
-        <p:txBody>
-          <a:bodyPr wrap="none">
-            <a:spAutoFit/>
-          </a:bodyPr>
-          <a:lstStyle/>
-          <a:p>
-            <a:pPr>
-              <a:defRPr sz="1400">
-                <a:solidFill>
-                  <a:srgbClr val="767C88"/>
+              <a:defRPr sz="1300">
+                <a:solidFill>
+                  <a:srgbClr val="82788C"/>
                 </a:solidFill>
               </a:defRPr>
             </a:pPr>
@@ -4064,7 +4091,7 @@
     <p:bg>
       <p:bgPr>
         <a:solidFill>
-          <a:srgbClr val="F0F4FC"/>
+          <a:srgbClr val="F7F4FB"/>
         </a:solidFill>
         <a:effectLst/>
       </p:bgPr>
@@ -4084,14 +4111,14 @@
         </p:nvSpPr>
         <p:spPr>
           <a:xfrm>
-            <a:off x="-91440" y="0"/>
-            <a:ext cx="9326880" cy="1188720"/>
+            <a:off x="0" y="0"/>
+            <a:ext cx="9144000" cy="1143000"/>
           </a:xfrm>
           <a:prstGeom prst="rect">
             <a:avLst/>
           </a:prstGeom>
           <a:solidFill>
-            <a:srgbClr val="06183A"/>
+            <a:srgbClr val="4B337D"/>
           </a:solidFill>
         </p:spPr>
         <p:style>
@@ -4124,14 +4151,14 @@
         </p:nvSpPr>
         <p:spPr>
           <a:xfrm>
-            <a:off x="-91440" y="1097280"/>
-            <a:ext cx="9326880" cy="320040"/>
+            <a:off x="0" y="1097280"/>
+            <a:ext cx="9144000" cy="292608"/>
           </a:xfrm>
           <a:prstGeom prst="rect">
             <a:avLst/>
           </a:prstGeom>
           <a:solidFill>
-            <a:srgbClr val="FF9843"/>
+            <a:srgbClr val="C4A2E7"/>
           </a:solidFill>
         </p:spPr>
         <p:style>
@@ -4165,7 +4192,7 @@
         <p:spPr>
           <a:xfrm>
             <a:off x="640080" y="1645920"/>
-            <a:ext cx="8046720" cy="4389120"/>
+            <a:ext cx="7863840" cy="4389120"/>
           </a:xfrm>
           <a:prstGeom prst="rect">
             <a:avLst/>
@@ -4175,7 +4202,7 @@
           </a:solidFill>
           <a:ln>
             <a:solidFill>
-              <a:srgbClr val="D2D9E6"/>
+              <a:srgbClr val="D6D0E0"/>
             </a:solidFill>
           </a:ln>
         </p:spPr>
@@ -4209,8 +4236,8 @@
         </p:nvSpPr>
         <p:spPr>
           <a:xfrm>
-            <a:off x="822960" y="228600"/>
-            <a:ext cx="7315200" cy="822960"/>
+            <a:off x="457200" y="228600"/>
+            <a:ext cx="6858000" cy="822960"/>
           </a:xfrm>
           <a:prstGeom prst="rect">
             <a:avLst/>
@@ -4244,7 +4271,7 @@
         </p:nvSpPr>
         <p:spPr>
           <a:xfrm>
-            <a:off x="822960" y="1097280"/>
+            <a:off x="457200" y="1078992"/>
             <a:ext cx="7315200" cy="457200"/>
           </a:xfrm>
           <a:prstGeom prst="rect">
@@ -4261,7 +4288,7 @@
             <a:pPr>
               <a:defRPr sz="2000">
                 <a:solidFill>
-                  <a:srgbClr val="FFFFFF"/>
+                  <a:srgbClr val="4B337D"/>
                 </a:solidFill>
               </a:defRPr>
             </a:pPr>
@@ -4279,8 +4306,85 @@
         </p:nvSpPr>
         <p:spPr>
           <a:xfrm>
-            <a:off x="1097280" y="1920240"/>
-            <a:ext cx="7132320" cy="3657600"/>
+            <a:off x="914400" y="1828800"/>
+            <a:ext cx="7223760" cy="4023360"/>
+          </a:xfrm>
+          <a:prstGeom prst="rect">
+            <a:avLst/>
+          </a:prstGeom>
+          <a:noFill/>
+        </p:spPr>
+        <p:txBody>
+          <a:bodyPr wrap="square" anchor="ctr">
+            <a:spAutoFit/>
+          </a:bodyPr>
+          <a:lstStyle/>
+          <a:p>
+            <a:pPr>
+              <a:lnSpc>
+                <a:spcPct val="120000"/>
+              </a:lnSpc>
+              <a:spcAft>
+                <a:spcPts val="1000"/>
+              </a:spcAft>
+              <a:defRPr sz="2000">
+                <a:solidFill>
+                  <a:srgbClr val="22182C"/>
+                </a:solidFill>
+              </a:defRPr>
+            </a:pPr>
+            <a:r>
+              <a:t>• Commande unique `docker compose up --build`.</a:t>
+            </a:r>
+          </a:p>
+          <a:p>
+            <a:pPr>
+              <a:lnSpc>
+                <a:spcPct val="120000"/>
+              </a:lnSpc>
+              <a:spcAft>
+                <a:spcPts val="1000"/>
+              </a:spcAft>
+              <a:defRPr sz="2000">
+                <a:solidFill>
+                  <a:srgbClr val="22182C"/>
+                </a:solidFill>
+              </a:defRPr>
+            </a:pPr>
+            <a:r>
+              <a:t>• Front NGINX dynamique consommant l'API via envsubst.</a:t>
+            </a:r>
+          </a:p>
+          <a:p>
+            <a:pPr>
+              <a:lnSpc>
+                <a:spcPct val="120000"/>
+              </a:lnSpc>
+              <a:spcAft>
+                <a:spcPts val="1000"/>
+              </a:spcAft>
+              <a:defRPr sz="2000">
+                <a:solidFill>
+                  <a:srgbClr val="22182C"/>
+                </a:solidFill>
+              </a:defRPr>
+            </a:pPr>
+            <a:r>
+              <a:t>• Aucune installation locale supplémentaire pour l'équipe.</a:t>
+            </a:r>
+          </a:p>
+        </p:txBody>
+      </p:sp>
+      <p:sp>
+        <p:nvSpPr>
+          <p:cNvPr id="8" name="TextBox 7"/>
+          <p:cNvSpPr txBox="1"/>
+          <p:nvPr/>
+        </p:nvSpPr>
+        <p:spPr>
+          <a:xfrm>
+            <a:off x="640080" y="5989320"/>
+            <a:ext cx="7955279" cy="320040"/>
           </a:xfrm>
           <a:prstGeom prst="rect">
             <a:avLst/>
@@ -4294,77 +4398,9 @@
           <a:lstStyle/>
           <a:p>
             <a:pPr>
-              <a:spcAft>
-                <a:spcPts val="1200"/>
-              </a:spcAft>
-              <a:defRPr sz="2200">
-                <a:solidFill>
-                  <a:srgbClr val="1E2228"/>
-                </a:solidFill>
-              </a:defRPr>
-            </a:pPr>
-            <a:r>
-              <a:t>• Commande unique `docker compose up --build`.</a:t>
-            </a:r>
-          </a:p>
-          <a:p>
-            <a:pPr>
-              <a:spcAft>
-                <a:spcPts val="1200"/>
-              </a:spcAft>
-              <a:defRPr sz="2200">
-                <a:solidFill>
-                  <a:srgbClr val="1E2228"/>
-                </a:solidFill>
-              </a:defRPr>
-            </a:pPr>
-            <a:r>
-              <a:t>• Front NGINX dynamique qui consomme l'API via envsubst.</a:t>
-            </a:r>
-          </a:p>
-          <a:p>
-            <a:pPr>
-              <a:spcAft>
-                <a:spcPts val="1200"/>
-              </a:spcAft>
-              <a:defRPr sz="2200">
-                <a:solidFill>
-                  <a:srgbClr val="1E2228"/>
-                </a:solidFill>
-              </a:defRPr>
-            </a:pPr>
-            <a:r>
-              <a:t>• Aucune installation locale des dépendances.</a:t>
-            </a:r>
-          </a:p>
-        </p:txBody>
-      </p:sp>
-      <p:sp>
-        <p:nvSpPr>
-          <p:cNvPr id="8" name="TextBox 7"/>
-          <p:cNvSpPr txBox="1"/>
-          <p:nvPr/>
-        </p:nvSpPr>
-        <p:spPr>
-          <a:xfrm>
-            <a:off x="640080" y="6080760"/>
-            <a:ext cx="8046720" cy="365760"/>
-          </a:xfrm>
-          <a:prstGeom prst="rect">
-            <a:avLst/>
-          </a:prstGeom>
-          <a:noFill/>
-        </p:spPr>
-        <p:txBody>
-          <a:bodyPr wrap="none">
-            <a:spAutoFit/>
-          </a:bodyPr>
-          <a:lstStyle/>
-          <a:p>
-            <a:pPr>
-              <a:defRPr sz="1400">
-                <a:solidFill>
-                  <a:srgbClr val="767C88"/>
+              <a:defRPr sz="1300">
+                <a:solidFill>
+                  <a:srgbClr val="82788C"/>
                 </a:solidFill>
               </a:defRPr>
             </a:pPr>
@@ -4388,7 +4424,7 @@
     <p:bg>
       <p:bgPr>
         <a:solidFill>
-          <a:srgbClr val="F0F4FC"/>
+          <a:srgbClr val="F7F4FB"/>
         </a:solidFill>
         <a:effectLst/>
       </p:bgPr>
@@ -4408,14 +4444,14 @@
         </p:nvSpPr>
         <p:spPr>
           <a:xfrm>
-            <a:off x="-91440" y="0"/>
-            <a:ext cx="9326880" cy="1188720"/>
+            <a:off x="0" y="0"/>
+            <a:ext cx="9144000" cy="1143000"/>
           </a:xfrm>
           <a:prstGeom prst="rect">
             <a:avLst/>
           </a:prstGeom>
           <a:solidFill>
-            <a:srgbClr val="06183A"/>
+            <a:srgbClr val="4B337D"/>
           </a:solidFill>
         </p:spPr>
         <p:style>
@@ -4448,14 +4484,14 @@
         </p:nvSpPr>
         <p:spPr>
           <a:xfrm>
-            <a:off x="-91440" y="1097280"/>
-            <a:ext cx="9326880" cy="320040"/>
+            <a:off x="0" y="1097280"/>
+            <a:ext cx="9144000" cy="292608"/>
           </a:xfrm>
           <a:prstGeom prst="rect">
             <a:avLst/>
           </a:prstGeom>
           <a:solidFill>
-            <a:srgbClr val="FF9843"/>
+            <a:srgbClr val="C4A2E7"/>
           </a:solidFill>
         </p:spPr>
         <p:style>
@@ -4489,7 +4525,7 @@
         <p:spPr>
           <a:xfrm>
             <a:off x="640080" y="1645920"/>
-            <a:ext cx="8046720" cy="4389120"/>
+            <a:ext cx="7863840" cy="4389120"/>
           </a:xfrm>
           <a:prstGeom prst="rect">
             <a:avLst/>
@@ -4499,7 +4535,7 @@
           </a:solidFill>
           <a:ln>
             <a:solidFill>
-              <a:srgbClr val="D2D9E6"/>
+              <a:srgbClr val="D6D0E0"/>
             </a:solidFill>
           </a:ln>
         </p:spPr>
@@ -4533,8 +4569,8 @@
         </p:nvSpPr>
         <p:spPr>
           <a:xfrm>
-            <a:off x="822960" y="228600"/>
-            <a:ext cx="7315200" cy="822960"/>
+            <a:off x="457200" y="228600"/>
+            <a:ext cx="6858000" cy="822960"/>
           </a:xfrm>
           <a:prstGeom prst="rect">
             <a:avLst/>
@@ -4568,7 +4604,7 @@
         </p:nvSpPr>
         <p:spPr>
           <a:xfrm>
-            <a:off x="822960" y="1097280"/>
+            <a:off x="457200" y="1078992"/>
             <a:ext cx="7315200" cy="457200"/>
           </a:xfrm>
           <a:prstGeom prst="rect">
@@ -4585,7 +4621,7 @@
             <a:pPr>
               <a:defRPr sz="2000">
                 <a:solidFill>
-                  <a:srgbClr val="FFFFFF"/>
+                  <a:srgbClr val="4B337D"/>
                 </a:solidFill>
               </a:defRPr>
             </a:pPr>
@@ -4603,8 +4639,85 @@
         </p:nvSpPr>
         <p:spPr>
           <a:xfrm>
-            <a:off x="1097280" y="1920240"/>
-            <a:ext cx="7132320" cy="3657600"/>
+            <a:off x="914400" y="1828800"/>
+            <a:ext cx="7223760" cy="4023360"/>
+          </a:xfrm>
+          <a:prstGeom prst="rect">
+            <a:avLst/>
+          </a:prstGeom>
+          <a:noFill/>
+        </p:spPr>
+        <p:txBody>
+          <a:bodyPr wrap="square" anchor="ctr">
+            <a:spAutoFit/>
+          </a:bodyPr>
+          <a:lstStyle/>
+          <a:p>
+            <a:pPr>
+              <a:lnSpc>
+                <a:spcPct val="120000"/>
+              </a:lnSpc>
+              <a:spcAft>
+                <a:spcPts val="1000"/>
+              </a:spcAft>
+              <a:defRPr sz="2000">
+                <a:solidFill>
+                  <a:srgbClr val="22182C"/>
+                </a:solidFill>
+              </a:defRPr>
+            </a:pPr>
+            <a:r>
+              <a:t>• API : 2 réplicas, probes `/health`, ressources requests/limits, exécution non-root.</a:t>
+            </a:r>
+          </a:p>
+          <a:p>
+            <a:pPr>
+              <a:lnSpc>
+                <a:spcPct val="120000"/>
+              </a:lnSpc>
+              <a:spcAft>
+                <a:spcPts val="1000"/>
+              </a:spcAft>
+              <a:defRPr sz="2000">
+                <a:solidFill>
+                  <a:srgbClr val="22182C"/>
+                </a:solidFill>
+              </a:defRPr>
+            </a:pPr>
+            <a:r>
+              <a:t>• Front : 1 réplique, readiness `/`, Service NodePort 30080.</a:t>
+            </a:r>
+          </a:p>
+          <a:p>
+            <a:pPr>
+              <a:lnSpc>
+                <a:spcPct val="120000"/>
+              </a:lnSpc>
+              <a:spcAft>
+                <a:spcPts val="1000"/>
+              </a:spcAft>
+              <a:defRPr sz="2000">
+                <a:solidFill>
+                  <a:srgbClr val="22182C"/>
+                </a:solidFill>
+              </a:defRPr>
+            </a:pPr>
+            <a:r>
+              <a:t>• ConfigMap &amp; Secret injectent message, environnement et token.</a:t>
+            </a:r>
+          </a:p>
+        </p:txBody>
+      </p:sp>
+      <p:sp>
+        <p:nvSpPr>
+          <p:cNvPr id="8" name="TextBox 7"/>
+          <p:cNvSpPr txBox="1"/>
+          <p:nvPr/>
+        </p:nvSpPr>
+        <p:spPr>
+          <a:xfrm>
+            <a:off x="640080" y="5989320"/>
+            <a:ext cx="7955279" cy="320040"/>
           </a:xfrm>
           <a:prstGeom prst="rect">
             <a:avLst/>
@@ -4618,77 +4731,9 @@
           <a:lstStyle/>
           <a:p>
             <a:pPr>
-              <a:spcAft>
-                <a:spcPts val="1200"/>
-              </a:spcAft>
-              <a:defRPr sz="2200">
-                <a:solidFill>
-                  <a:srgbClr val="1E2228"/>
-                </a:solidFill>
-              </a:defRPr>
-            </a:pPr>
-            <a:r>
-              <a:t>• API : 2 réplicas, probes `/health`, ressources requests/limits, exécution non-root.</a:t>
-            </a:r>
-          </a:p>
-          <a:p>
-            <a:pPr>
-              <a:spcAft>
-                <a:spcPts val="1200"/>
-              </a:spcAft>
-              <a:defRPr sz="2200">
-                <a:solidFill>
-                  <a:srgbClr val="1E2228"/>
-                </a:solidFill>
-              </a:defRPr>
-            </a:pPr>
-            <a:r>
-              <a:t>• Front : 1 réplique, readiness `/`, Service NodePort 30080.</a:t>
-            </a:r>
-          </a:p>
-          <a:p>
-            <a:pPr>
-              <a:spcAft>
-                <a:spcPts val="1200"/>
-              </a:spcAft>
-              <a:defRPr sz="2200">
-                <a:solidFill>
-                  <a:srgbClr val="1E2228"/>
-                </a:solidFill>
-              </a:defRPr>
-            </a:pPr>
-            <a:r>
-              <a:t>• ConfigMap &amp; Secret injectés via envFrom pour message, environnement et token.</a:t>
-            </a:r>
-          </a:p>
-        </p:txBody>
-      </p:sp>
-      <p:sp>
-        <p:nvSpPr>
-          <p:cNvPr id="8" name="TextBox 7"/>
-          <p:cNvSpPr txBox="1"/>
-          <p:nvPr/>
-        </p:nvSpPr>
-        <p:spPr>
-          <a:xfrm>
-            <a:off x="640080" y="6080760"/>
-            <a:ext cx="8046720" cy="365760"/>
-          </a:xfrm>
-          <a:prstGeom prst="rect">
-            <a:avLst/>
-          </a:prstGeom>
-          <a:noFill/>
-        </p:spPr>
-        <p:txBody>
-          <a:bodyPr wrap="none">
-            <a:spAutoFit/>
-          </a:bodyPr>
-          <a:lstStyle/>
-          <a:p>
-            <a:pPr>
-              <a:defRPr sz="1400">
-                <a:solidFill>
-                  <a:srgbClr val="767C88"/>
+              <a:defRPr sz="1300">
+                <a:solidFill>
+                  <a:srgbClr val="82788C"/>
                 </a:solidFill>
               </a:defRPr>
             </a:pPr>
@@ -4712,7 +4757,7 @@
     <p:bg>
       <p:bgPr>
         <a:solidFill>
-          <a:srgbClr val="F0F4FC"/>
+          <a:srgbClr val="F7F4FB"/>
         </a:solidFill>
         <a:effectLst/>
       </p:bgPr>
@@ -4732,14 +4777,14 @@
         </p:nvSpPr>
         <p:spPr>
           <a:xfrm>
-            <a:off x="-91440" y="0"/>
-            <a:ext cx="9326880" cy="1188720"/>
+            <a:off x="0" y="0"/>
+            <a:ext cx="9144000" cy="1143000"/>
           </a:xfrm>
           <a:prstGeom prst="rect">
             <a:avLst/>
           </a:prstGeom>
           <a:solidFill>
-            <a:srgbClr val="06183A"/>
+            <a:srgbClr val="4B337D"/>
           </a:solidFill>
         </p:spPr>
         <p:style>
@@ -4772,14 +4817,14 @@
         </p:nvSpPr>
         <p:spPr>
           <a:xfrm>
-            <a:off x="-91440" y="1097280"/>
-            <a:ext cx="9326880" cy="320040"/>
+            <a:off x="0" y="1097280"/>
+            <a:ext cx="9144000" cy="292608"/>
           </a:xfrm>
           <a:prstGeom prst="rect">
             <a:avLst/>
           </a:prstGeom>
           <a:solidFill>
-            <a:srgbClr val="FF9843"/>
+            <a:srgbClr val="C4A2E7"/>
           </a:solidFill>
         </p:spPr>
         <p:style>
@@ -4813,7 +4858,7 @@
         <p:spPr>
           <a:xfrm>
             <a:off x="640080" y="1645920"/>
-            <a:ext cx="8046720" cy="4389120"/>
+            <a:ext cx="7863840" cy="4389120"/>
           </a:xfrm>
           <a:prstGeom prst="rect">
             <a:avLst/>
@@ -4823,7 +4868,7 @@
           </a:solidFill>
           <a:ln>
             <a:solidFill>
-              <a:srgbClr val="D2D9E6"/>
+              <a:srgbClr val="D6D0E0"/>
             </a:solidFill>
           </a:ln>
         </p:spPr>
@@ -4857,8 +4902,8 @@
         </p:nvSpPr>
         <p:spPr>
           <a:xfrm>
-            <a:off x="822960" y="228600"/>
-            <a:ext cx="7315200" cy="822960"/>
+            <a:off x="457200" y="228600"/>
+            <a:ext cx="6858000" cy="822960"/>
           </a:xfrm>
           <a:prstGeom prst="rect">
             <a:avLst/>
@@ -4892,7 +4937,7 @@
         </p:nvSpPr>
         <p:spPr>
           <a:xfrm>
-            <a:off x="822960" y="1097280"/>
+            <a:off x="457200" y="1078992"/>
             <a:ext cx="7315200" cy="457200"/>
           </a:xfrm>
           <a:prstGeom prst="rect">
@@ -4909,7 +4954,7 @@
             <a:pPr>
               <a:defRPr sz="2000">
                 <a:solidFill>
-                  <a:srgbClr val="FFFFFF"/>
+                  <a:srgbClr val="4B337D"/>
                 </a:solidFill>
               </a:defRPr>
             </a:pPr>
@@ -4927,8 +4972,85 @@
         </p:nvSpPr>
         <p:spPr>
           <a:xfrm>
-            <a:off x="1097280" y="1920240"/>
-            <a:ext cx="7132320" cy="3657600"/>
+            <a:off x="914400" y="1828800"/>
+            <a:ext cx="7223760" cy="4023360"/>
+          </a:xfrm>
+          <a:prstGeom prst="rect">
+            <a:avLst/>
+          </a:prstGeom>
+          <a:noFill/>
+        </p:spPr>
+        <p:txBody>
+          <a:bodyPr wrap="square" anchor="ctr">
+            <a:spAutoFit/>
+          </a:bodyPr>
+          <a:lstStyle/>
+          <a:p>
+            <a:pPr>
+              <a:lnSpc>
+                <a:spcPct val="120000"/>
+              </a:lnSpc>
+              <a:spcAft>
+                <a:spcPts val="1000"/>
+              </a:spcAft>
+              <a:defRPr sz="2000">
+                <a:solidFill>
+                  <a:srgbClr val="22182C"/>
+                </a:solidFill>
+              </a:defRPr>
+            </a:pPr>
+            <a:r>
+              <a:t>• Images multi-stage, surface réduite, utilisateur applicatif.</a:t>
+            </a:r>
+          </a:p>
+          <a:p>
+            <a:pPr>
+              <a:lnSpc>
+                <a:spcPct val="120000"/>
+              </a:lnSpc>
+              <a:spcAft>
+                <a:spcPts val="1000"/>
+              </a:spcAft>
+              <a:defRPr sz="2000">
+                <a:solidFill>
+                  <a:srgbClr val="22182C"/>
+                </a:solidFill>
+              </a:defRPr>
+            </a:pPr>
+            <a:r>
+              <a:t>• Probes readiness/liveness + ressources bornées = résilience.</a:t>
+            </a:r>
+          </a:p>
+          <a:p>
+            <a:pPr>
+              <a:lnSpc>
+                <a:spcPct val="120000"/>
+              </a:lnSpc>
+              <a:spcAft>
+                <a:spcPts val="1000"/>
+              </a:spcAft>
+              <a:defRPr sz="2000">
+                <a:solidFill>
+                  <a:srgbClr val="22182C"/>
+                </a:solidFill>
+              </a:defRPr>
+            </a:pPr>
+            <a:r>
+              <a:t>• Secrets isolent les données sensibles, ConfigMaps documentent le paramétrage.</a:t>
+            </a:r>
+          </a:p>
+        </p:txBody>
+      </p:sp>
+      <p:sp>
+        <p:nvSpPr>
+          <p:cNvPr id="8" name="TextBox 7"/>
+          <p:cNvSpPr txBox="1"/>
+          <p:nvPr/>
+        </p:nvSpPr>
+        <p:spPr>
+          <a:xfrm>
+            <a:off x="640080" y="5989320"/>
+            <a:ext cx="7955279" cy="320040"/>
           </a:xfrm>
           <a:prstGeom prst="rect">
             <a:avLst/>
@@ -4942,77 +5064,9 @@
           <a:lstStyle/>
           <a:p>
             <a:pPr>
-              <a:spcAft>
-                <a:spcPts val="1200"/>
-              </a:spcAft>
-              <a:defRPr sz="2200">
-                <a:solidFill>
-                  <a:srgbClr val="1E2228"/>
-                </a:solidFill>
-              </a:defRPr>
-            </a:pPr>
-            <a:r>
-              <a:t>• Images multi-stage, surface réduite, utilisateur applicatif.</a:t>
-            </a:r>
-          </a:p>
-          <a:p>
-            <a:pPr>
-              <a:spcAft>
-                <a:spcPts val="1200"/>
-              </a:spcAft>
-              <a:defRPr sz="2200">
-                <a:solidFill>
-                  <a:srgbClr val="1E2228"/>
-                </a:solidFill>
-              </a:defRPr>
-            </a:pPr>
-            <a:r>
-              <a:t>• Probes readiness/liveness + ressources bornées = résilience.</a:t>
-            </a:r>
-          </a:p>
-          <a:p>
-            <a:pPr>
-              <a:spcAft>
-                <a:spcPts val="1200"/>
-              </a:spcAft>
-              <a:defRPr sz="2200">
-                <a:solidFill>
-                  <a:srgbClr val="1E2228"/>
-                </a:solidFill>
-              </a:defRPr>
-            </a:pPr>
-            <a:r>
-              <a:t>• Secrets isolent les données sensibles, ConfigMaps documentent le paramétrage.</a:t>
-            </a:r>
-          </a:p>
-        </p:txBody>
-      </p:sp>
-      <p:sp>
-        <p:nvSpPr>
-          <p:cNvPr id="8" name="TextBox 7"/>
-          <p:cNvSpPr txBox="1"/>
-          <p:nvPr/>
-        </p:nvSpPr>
-        <p:spPr>
-          <a:xfrm>
-            <a:off x="640080" y="6080760"/>
-            <a:ext cx="8046720" cy="365760"/>
-          </a:xfrm>
-          <a:prstGeom prst="rect">
-            <a:avLst/>
-          </a:prstGeom>
-          <a:noFill/>
-        </p:spPr>
-        <p:txBody>
-          <a:bodyPr wrap="none">
-            <a:spAutoFit/>
-          </a:bodyPr>
-          <a:lstStyle/>
-          <a:p>
-            <a:pPr>
-              <a:defRPr sz="1400">
-                <a:solidFill>
-                  <a:srgbClr val="767C88"/>
+              <a:defRPr sz="1300">
+                <a:solidFill>
+                  <a:srgbClr val="82788C"/>
                 </a:solidFill>
               </a:defRPr>
             </a:pPr>
@@ -5036,7 +5090,7 @@
     <p:bg>
       <p:bgPr>
         <a:solidFill>
-          <a:srgbClr val="F0F4FC"/>
+          <a:srgbClr val="F7F4FB"/>
         </a:solidFill>
         <a:effectLst/>
       </p:bgPr>
@@ -5056,14 +5110,14 @@
         </p:nvSpPr>
         <p:spPr>
           <a:xfrm>
-            <a:off x="-91440" y="0"/>
-            <a:ext cx="9326880" cy="1188720"/>
+            <a:off x="0" y="0"/>
+            <a:ext cx="9144000" cy="1143000"/>
           </a:xfrm>
           <a:prstGeom prst="rect">
             <a:avLst/>
           </a:prstGeom>
           <a:solidFill>
-            <a:srgbClr val="06183A"/>
+            <a:srgbClr val="4B337D"/>
           </a:solidFill>
         </p:spPr>
         <p:style>
@@ -5096,14 +5150,14 @@
         </p:nvSpPr>
         <p:spPr>
           <a:xfrm>
-            <a:off x="-91440" y="1097280"/>
-            <a:ext cx="9326880" cy="320040"/>
+            <a:off x="0" y="1097280"/>
+            <a:ext cx="9144000" cy="292608"/>
           </a:xfrm>
           <a:prstGeom prst="rect">
             <a:avLst/>
           </a:prstGeom>
           <a:solidFill>
-            <a:srgbClr val="FF9843"/>
+            <a:srgbClr val="C4A2E7"/>
           </a:solidFill>
         </p:spPr>
         <p:style>
@@ -5137,7 +5191,7 @@
         <p:spPr>
           <a:xfrm>
             <a:off x="640080" y="1645920"/>
-            <a:ext cx="8046720" cy="4389120"/>
+            <a:ext cx="7863840" cy="4389120"/>
           </a:xfrm>
           <a:prstGeom prst="rect">
             <a:avLst/>
@@ -5147,7 +5201,7 @@
           </a:solidFill>
           <a:ln>
             <a:solidFill>
-              <a:srgbClr val="D2D9E6"/>
+              <a:srgbClr val="D6D0E0"/>
             </a:solidFill>
           </a:ln>
         </p:spPr>
@@ -5181,8 +5235,8 @@
         </p:nvSpPr>
         <p:spPr>
           <a:xfrm>
-            <a:off x="822960" y="228600"/>
-            <a:ext cx="7315200" cy="822960"/>
+            <a:off x="457200" y="228600"/>
+            <a:ext cx="6858000" cy="822960"/>
           </a:xfrm>
           <a:prstGeom prst="rect">
             <a:avLst/>
@@ -5216,7 +5270,7 @@
         </p:nvSpPr>
         <p:spPr>
           <a:xfrm>
-            <a:off x="822960" y="1097280"/>
+            <a:off x="457200" y="1078992"/>
             <a:ext cx="7315200" cy="457200"/>
           </a:xfrm>
           <a:prstGeom prst="rect">
@@ -5233,7 +5287,7 @@
             <a:pPr>
               <a:defRPr sz="2000">
                 <a:solidFill>
-                  <a:srgbClr val="FFFFFF"/>
+                  <a:srgbClr val="4B337D"/>
                 </a:solidFill>
               </a:defRPr>
             </a:pPr>
@@ -5251,8 +5305,85 @@
         </p:nvSpPr>
         <p:spPr>
           <a:xfrm>
-            <a:off x="1097280" y="1920240"/>
-            <a:ext cx="7132320" cy="3657600"/>
+            <a:off x="914400" y="1828800"/>
+            <a:ext cx="7223760" cy="4023360"/>
+          </a:xfrm>
+          <a:prstGeom prst="rect">
+            <a:avLst/>
+          </a:prstGeom>
+          <a:noFill/>
+        </p:spPr>
+        <p:txBody>
+          <a:bodyPr wrap="square" anchor="ctr">
+            <a:spAutoFit/>
+          </a:bodyPr>
+          <a:lstStyle/>
+          <a:p>
+            <a:pPr>
+              <a:lnSpc>
+                <a:spcPct val="120000"/>
+              </a:lnSpc>
+              <a:spcAft>
+                <a:spcPts val="1000"/>
+              </a:spcAft>
+              <a:defRPr sz="2000">
+                <a:solidFill>
+                  <a:srgbClr val="22182C"/>
+                </a:solidFill>
+              </a:defRPr>
+            </a:pPr>
+            <a:r>
+              <a:t>• Workflow GitHub Actions : checkout, setup Python, install deps, build image API.</a:t>
+            </a:r>
+          </a:p>
+          <a:p>
+            <a:pPr>
+              <a:lnSpc>
+                <a:spcPct val="120000"/>
+              </a:lnSpc>
+              <a:spcAft>
+                <a:spcPts val="1000"/>
+              </a:spcAft>
+              <a:defRPr sz="2000">
+                <a:solidFill>
+                  <a:srgbClr val="22182C"/>
+                </a:solidFill>
+              </a:defRPr>
+            </a:pPr>
+            <a:r>
+              <a:t>• Déclenchement sur push `main` → build reproductible.</a:t>
+            </a:r>
+          </a:p>
+          <a:p>
+            <a:pPr>
+              <a:lnSpc>
+                <a:spcPct val="120000"/>
+              </a:lnSpc>
+              <a:spcAft>
+                <a:spcPts val="1000"/>
+              </a:spcAft>
+              <a:defRPr sz="2000">
+                <a:solidFill>
+                  <a:srgbClr val="22182C"/>
+                </a:solidFill>
+              </a:defRPr>
+            </a:pPr>
+            <a:r>
+              <a:t>• Base extensible pour tests, scans sécurité, push registre.</a:t>
+            </a:r>
+          </a:p>
+        </p:txBody>
+      </p:sp>
+      <p:sp>
+        <p:nvSpPr>
+          <p:cNvPr id="8" name="TextBox 7"/>
+          <p:cNvSpPr txBox="1"/>
+          <p:nvPr/>
+        </p:nvSpPr>
+        <p:spPr>
+          <a:xfrm>
+            <a:off x="640080" y="5989320"/>
+            <a:ext cx="7955279" cy="320040"/>
           </a:xfrm>
           <a:prstGeom prst="rect">
             <a:avLst/>
@@ -5266,77 +5397,9 @@
           <a:lstStyle/>
           <a:p>
             <a:pPr>
-              <a:spcAft>
-                <a:spcPts val="1200"/>
-              </a:spcAft>
-              <a:defRPr sz="2200">
-                <a:solidFill>
-                  <a:srgbClr val="1E2228"/>
-                </a:solidFill>
-              </a:defRPr>
-            </a:pPr>
-            <a:r>
-              <a:t>• Workflow GitHub Actions : checkout, setup Python, install deps, build image API.</a:t>
-            </a:r>
-          </a:p>
-          <a:p>
-            <a:pPr>
-              <a:spcAft>
-                <a:spcPts val="1200"/>
-              </a:spcAft>
-              <a:defRPr sz="2200">
-                <a:solidFill>
-                  <a:srgbClr val="1E2228"/>
-                </a:solidFill>
-              </a:defRPr>
-            </a:pPr>
-            <a:r>
-              <a:t>• Déclenchement sur push `main` → build reproductible.</a:t>
-            </a:r>
-          </a:p>
-          <a:p>
-            <a:pPr>
-              <a:spcAft>
-                <a:spcPts val="1200"/>
-              </a:spcAft>
-              <a:defRPr sz="2200">
-                <a:solidFill>
-                  <a:srgbClr val="1E2228"/>
-                </a:solidFill>
-              </a:defRPr>
-            </a:pPr>
-            <a:r>
-              <a:t>• Base extensible pour tests, scans sécurité, push registre.</a:t>
-            </a:r>
-          </a:p>
-        </p:txBody>
-      </p:sp>
-      <p:sp>
-        <p:nvSpPr>
-          <p:cNvPr id="8" name="TextBox 7"/>
-          <p:cNvSpPr txBox="1"/>
-          <p:nvPr/>
-        </p:nvSpPr>
-        <p:spPr>
-          <a:xfrm>
-            <a:off x="640080" y="6080760"/>
-            <a:ext cx="8046720" cy="365760"/>
-          </a:xfrm>
-          <a:prstGeom prst="rect">
-            <a:avLst/>
-          </a:prstGeom>
-          <a:noFill/>
-        </p:spPr>
-        <p:txBody>
-          <a:bodyPr wrap="none">
-            <a:spAutoFit/>
-          </a:bodyPr>
-          <a:lstStyle/>
-          <a:p>
-            <a:pPr>
-              <a:defRPr sz="1400">
-                <a:solidFill>
-                  <a:srgbClr val="767C88"/>
+              <a:defRPr sz="1300">
+                <a:solidFill>
+                  <a:srgbClr val="82788C"/>
                 </a:solidFill>
               </a:defRPr>
             </a:pPr>
@@ -5360,7 +5423,7 @@
     <p:bg>
       <p:bgPr>
         <a:solidFill>
-          <a:srgbClr val="F0F4FC"/>
+          <a:srgbClr val="F7F4FB"/>
         </a:solidFill>
         <a:effectLst/>
       </p:bgPr>
@@ -5380,14 +5443,14 @@
         </p:nvSpPr>
         <p:spPr>
           <a:xfrm>
-            <a:off x="-91440" y="0"/>
-            <a:ext cx="9326880" cy="1188720"/>
+            <a:off x="0" y="0"/>
+            <a:ext cx="9144000" cy="1143000"/>
           </a:xfrm>
           <a:prstGeom prst="rect">
             <a:avLst/>
           </a:prstGeom>
           <a:solidFill>
-            <a:srgbClr val="06183A"/>
+            <a:srgbClr val="4B337D"/>
           </a:solidFill>
         </p:spPr>
         <p:style>
@@ -5420,14 +5483,14 @@
         </p:nvSpPr>
         <p:spPr>
           <a:xfrm>
-            <a:off x="-91440" y="1097280"/>
-            <a:ext cx="9326880" cy="320040"/>
+            <a:off x="0" y="1097280"/>
+            <a:ext cx="9144000" cy="292608"/>
           </a:xfrm>
           <a:prstGeom prst="rect">
             <a:avLst/>
           </a:prstGeom>
           <a:solidFill>
-            <a:srgbClr val="FF9843"/>
+            <a:srgbClr val="C4A2E7"/>
           </a:solidFill>
         </p:spPr>
         <p:style>
@@ -5461,7 +5524,7 @@
         <p:spPr>
           <a:xfrm>
             <a:off x="640080" y="1645920"/>
-            <a:ext cx="8046720" cy="4389120"/>
+            <a:ext cx="7863840" cy="4389120"/>
           </a:xfrm>
           <a:prstGeom prst="rect">
             <a:avLst/>
@@ -5471,7 +5534,7 @@
           </a:solidFill>
           <a:ln>
             <a:solidFill>
-              <a:srgbClr val="D2D9E6"/>
+              <a:srgbClr val="D6D0E0"/>
             </a:solidFill>
           </a:ln>
         </p:spPr>
@@ -5505,8 +5568,8 @@
         </p:nvSpPr>
         <p:spPr>
           <a:xfrm>
-            <a:off x="822960" y="228600"/>
-            <a:ext cx="7315200" cy="822960"/>
+            <a:off x="457200" y="228600"/>
+            <a:ext cx="6858000" cy="822960"/>
           </a:xfrm>
           <a:prstGeom prst="rect">
             <a:avLst/>
@@ -5540,7 +5603,7 @@
         </p:nvSpPr>
         <p:spPr>
           <a:xfrm>
-            <a:off x="822960" y="1097280"/>
+            <a:off x="457200" y="1078992"/>
             <a:ext cx="7315200" cy="457200"/>
           </a:xfrm>
           <a:prstGeom prst="rect">
@@ -5557,7 +5620,7 @@
             <a:pPr>
               <a:defRPr sz="2000">
                 <a:solidFill>
-                  <a:srgbClr val="FFFFFF"/>
+                  <a:srgbClr val="4B337D"/>
                 </a:solidFill>
               </a:defRPr>
             </a:pPr>
@@ -5575,8 +5638,85 @@
         </p:nvSpPr>
         <p:spPr>
           <a:xfrm>
-            <a:off x="1097280" y="1920240"/>
-            <a:ext cx="7132320" cy="3657600"/>
+            <a:off x="914400" y="1828800"/>
+            <a:ext cx="7223760" cy="4023360"/>
+          </a:xfrm>
+          <a:prstGeom prst="rect">
+            <a:avLst/>
+          </a:prstGeom>
+          <a:noFill/>
+        </p:spPr>
+        <p:txBody>
+          <a:bodyPr wrap="square" anchor="ctr">
+            <a:spAutoFit/>
+          </a:bodyPr>
+          <a:lstStyle/>
+          <a:p>
+            <a:pPr>
+              <a:lnSpc>
+                <a:spcPct val="120000"/>
+              </a:lnSpc>
+              <a:spcAft>
+                <a:spcPts val="1000"/>
+              </a:spcAft>
+              <a:defRPr sz="2000">
+                <a:solidFill>
+                  <a:srgbClr val="22182C"/>
+                </a:solidFill>
+              </a:defRPr>
+            </a:pPr>
+            <a:r>
+              <a:t>• Ajouter Ingress + TLS, observabilité (Prometheus/Grafana) et base persistante.</a:t>
+            </a:r>
+          </a:p>
+          <a:p>
+            <a:pPr>
+              <a:lnSpc>
+                <a:spcPct val="120000"/>
+              </a:lnSpc>
+              <a:spcAft>
+                <a:spcPts val="1000"/>
+              </a:spcAft>
+              <a:defRPr sz="2000">
+                <a:solidFill>
+                  <a:srgbClr val="22182C"/>
+                </a:solidFill>
+              </a:defRPr>
+            </a:pPr>
+            <a:r>
+              <a:t>• Étendre CI/CD : tests, scans, promotions automatiques, signature.</a:t>
+            </a:r>
+          </a:p>
+          <a:p>
+            <a:pPr>
+              <a:lnSpc>
+                <a:spcPct val="120000"/>
+              </a:lnSpc>
+              <a:spcAft>
+                <a:spcPts val="1000"/>
+              </a:spcAft>
+              <a:defRPr sz="2000">
+                <a:solidFill>
+                  <a:srgbClr val="22182C"/>
+                </a:solidFill>
+              </a:defRPr>
+            </a:pPr>
+            <a:r>
+              <a:t>• Mettre en place NetworkPolicies et préparer l'autoscaling (HPA).</a:t>
+            </a:r>
+          </a:p>
+        </p:txBody>
+      </p:sp>
+      <p:sp>
+        <p:nvSpPr>
+          <p:cNvPr id="8" name="TextBox 7"/>
+          <p:cNvSpPr txBox="1"/>
+          <p:nvPr/>
+        </p:nvSpPr>
+        <p:spPr>
+          <a:xfrm>
+            <a:off x="640080" y="5989320"/>
+            <a:ext cx="7955279" cy="320040"/>
           </a:xfrm>
           <a:prstGeom prst="rect">
             <a:avLst/>
@@ -5590,77 +5730,9 @@
           <a:lstStyle/>
           <a:p>
             <a:pPr>
-              <a:spcAft>
-                <a:spcPts val="1200"/>
-              </a:spcAft>
-              <a:defRPr sz="2200">
-                <a:solidFill>
-                  <a:srgbClr val="1E2228"/>
-                </a:solidFill>
-              </a:defRPr>
-            </a:pPr>
-            <a:r>
-              <a:t>• Ajouter Ingress + TLS, observabilité (Prometheus/Grafana) et base persistante.</a:t>
-            </a:r>
-          </a:p>
-          <a:p>
-            <a:pPr>
-              <a:spcAft>
-                <a:spcPts val="1200"/>
-              </a:spcAft>
-              <a:defRPr sz="2200">
-                <a:solidFill>
-                  <a:srgbClr val="1E2228"/>
-                </a:solidFill>
-              </a:defRPr>
-            </a:pPr>
-            <a:r>
-              <a:t>• Étendre CI/CD : tests, scans, promotions automatiques, signature d'images.</a:t>
-            </a:r>
-          </a:p>
-          <a:p>
-            <a:pPr>
-              <a:spcAft>
-                <a:spcPts val="1200"/>
-              </a:spcAft>
-              <a:defRPr sz="2200">
-                <a:solidFill>
-                  <a:srgbClr val="1E2228"/>
-                </a:solidFill>
-              </a:defRPr>
-            </a:pPr>
-            <a:r>
-              <a:t>• Mettre en place NetworkPolicies et préparer l'autoscaling (HPA).</a:t>
-            </a:r>
-          </a:p>
-        </p:txBody>
-      </p:sp>
-      <p:sp>
-        <p:nvSpPr>
-          <p:cNvPr id="8" name="TextBox 7"/>
-          <p:cNvSpPr txBox="1"/>
-          <p:nvPr/>
-        </p:nvSpPr>
-        <p:spPr>
-          <a:xfrm>
-            <a:off x="640080" y="6080760"/>
-            <a:ext cx="8046720" cy="365760"/>
-          </a:xfrm>
-          <a:prstGeom prst="rect">
-            <a:avLst/>
-          </a:prstGeom>
-          <a:noFill/>
-        </p:spPr>
-        <p:txBody>
-          <a:bodyPr wrap="none">
-            <a:spAutoFit/>
-          </a:bodyPr>
-          <a:lstStyle/>
-          <a:p>
-            <a:pPr>
-              <a:defRPr sz="1400">
-                <a:solidFill>
-                  <a:srgbClr val="767C88"/>
+              <a:defRPr sz="1300">
+                <a:solidFill>
+                  <a:srgbClr val="82788C"/>
                 </a:solidFill>
               </a:defRPr>
             </a:pPr>
@@ -5684,7 +5756,7 @@
     <p:bg>
       <p:bgPr>
         <a:solidFill>
-          <a:srgbClr val="F0F4FC"/>
+          <a:srgbClr val="F7F4FB"/>
         </a:solidFill>
         <a:effectLst/>
       </p:bgPr>
@@ -5704,14 +5776,14 @@
         </p:nvSpPr>
         <p:spPr>
           <a:xfrm>
-            <a:off x="-91440" y="0"/>
-            <a:ext cx="9326880" cy="1188720"/>
+            <a:off x="0" y="0"/>
+            <a:ext cx="9144000" cy="1143000"/>
           </a:xfrm>
           <a:prstGeom prst="rect">
             <a:avLst/>
           </a:prstGeom>
           <a:solidFill>
-            <a:srgbClr val="06183A"/>
+            <a:srgbClr val="4B337D"/>
           </a:solidFill>
         </p:spPr>
         <p:style>
@@ -5744,14 +5816,14 @@
         </p:nvSpPr>
         <p:spPr>
           <a:xfrm>
-            <a:off x="-91440" y="1097280"/>
-            <a:ext cx="9326880" cy="320040"/>
+            <a:off x="0" y="1097280"/>
+            <a:ext cx="9144000" cy="292608"/>
           </a:xfrm>
           <a:prstGeom prst="rect">
             <a:avLst/>
           </a:prstGeom>
           <a:solidFill>
-            <a:srgbClr val="FF9843"/>
+            <a:srgbClr val="C4A2E7"/>
           </a:solidFill>
         </p:spPr>
         <p:style>
@@ -5785,7 +5857,7 @@
         <p:spPr>
           <a:xfrm>
             <a:off x="640080" y="1645920"/>
-            <a:ext cx="8046720" cy="4389120"/>
+            <a:ext cx="7863840" cy="4389120"/>
           </a:xfrm>
           <a:prstGeom prst="rect">
             <a:avLst/>
@@ -5795,7 +5867,7 @@
           </a:solidFill>
           <a:ln>
             <a:solidFill>
-              <a:srgbClr val="D2D9E6"/>
+              <a:srgbClr val="D6D0E0"/>
             </a:solidFill>
           </a:ln>
         </p:spPr>
@@ -5829,8 +5901,8 @@
         </p:nvSpPr>
         <p:spPr>
           <a:xfrm>
-            <a:off x="822960" y="228600"/>
-            <a:ext cx="7315200" cy="822960"/>
+            <a:off x="457200" y="228600"/>
+            <a:ext cx="6858000" cy="822960"/>
           </a:xfrm>
           <a:prstGeom prst="rect">
             <a:avLst/>
@@ -5864,7 +5936,7 @@
         </p:nvSpPr>
         <p:spPr>
           <a:xfrm>
-            <a:off x="822960" y="1097280"/>
+            <a:off x="457200" y="1078992"/>
             <a:ext cx="7315200" cy="457200"/>
           </a:xfrm>
           <a:prstGeom prst="rect">
@@ -5881,7 +5953,7 @@
             <a:pPr>
               <a:defRPr sz="2000">
                 <a:solidFill>
-                  <a:srgbClr val="FFFFFF"/>
+                  <a:srgbClr val="4B337D"/>
                 </a:solidFill>
               </a:defRPr>
             </a:pPr>
@@ -5899,8 +5971,85 @@
         </p:nvSpPr>
         <p:spPr>
           <a:xfrm>
-            <a:off x="1097280" y="1920240"/>
-            <a:ext cx="7132320" cy="3657600"/>
+            <a:off x="914400" y="1828800"/>
+            <a:ext cx="7223760" cy="4023360"/>
+          </a:xfrm>
+          <a:prstGeom prst="rect">
+            <a:avLst/>
+          </a:prstGeom>
+          <a:noFill/>
+        </p:spPr>
+        <p:txBody>
+          <a:bodyPr wrap="square" anchor="ctr">
+            <a:spAutoFit/>
+          </a:bodyPr>
+          <a:lstStyle/>
+          <a:p>
+            <a:pPr>
+              <a:lnSpc>
+                <a:spcPct val="120000"/>
+              </a:lnSpc>
+              <a:spcAft>
+                <a:spcPts val="1000"/>
+              </a:spcAft>
+              <a:defRPr sz="2000">
+                <a:solidFill>
+                  <a:srgbClr val="22182C"/>
+                </a:solidFill>
+              </a:defRPr>
+            </a:pPr>
+            <a:r>
+              <a:t>• POC rejouable, documenté, conforme aux attentes DataPress.</a:t>
+            </a:r>
+          </a:p>
+          <a:p>
+            <a:pPr>
+              <a:lnSpc>
+                <a:spcPct val="120000"/>
+              </a:lnSpc>
+              <a:spcAft>
+                <a:spcPts val="1000"/>
+              </a:spcAft>
+              <a:defRPr sz="2000">
+                <a:solidFill>
+                  <a:srgbClr val="22182C"/>
+                </a:solidFill>
+              </a:defRPr>
+            </a:pPr>
+            <a:r>
+              <a:t>• Séparation des services + CI/CD amorcée démontrent la trajectoire cible.</a:t>
+            </a:r>
+          </a:p>
+          <a:p>
+            <a:pPr>
+              <a:lnSpc>
+                <a:spcPct val="120000"/>
+              </a:lnSpc>
+              <a:spcAft>
+                <a:spcPts val="1000"/>
+              </a:spcAft>
+              <a:defRPr sz="2000">
+                <a:solidFill>
+                  <a:srgbClr val="22182C"/>
+                </a:solidFill>
+              </a:defRPr>
+            </a:pPr>
+            <a:r>
+              <a:t>• Prochaine étape : validation DSI puis cadrage industrialisation.</a:t>
+            </a:r>
+          </a:p>
+        </p:txBody>
+      </p:sp>
+      <p:sp>
+        <p:nvSpPr>
+          <p:cNvPr id="8" name="TextBox 7"/>
+          <p:cNvSpPr txBox="1"/>
+          <p:nvPr/>
+        </p:nvSpPr>
+        <p:spPr>
+          <a:xfrm>
+            <a:off x="640080" y="5989320"/>
+            <a:ext cx="7955279" cy="320040"/>
           </a:xfrm>
           <a:prstGeom prst="rect">
             <a:avLst/>
@@ -5914,77 +6063,9 @@
           <a:lstStyle/>
           <a:p>
             <a:pPr>
-              <a:spcAft>
-                <a:spcPts val="1200"/>
-              </a:spcAft>
-              <a:defRPr sz="2200">
-                <a:solidFill>
-                  <a:srgbClr val="1E2228"/>
-                </a:solidFill>
-              </a:defRPr>
-            </a:pPr>
-            <a:r>
-              <a:t>• POC rejouable, documenté, conforme aux attentes DataPress.</a:t>
-            </a:r>
-          </a:p>
-          <a:p>
-            <a:pPr>
-              <a:spcAft>
-                <a:spcPts val="1200"/>
-              </a:spcAft>
-              <a:defRPr sz="2200">
-                <a:solidFill>
-                  <a:srgbClr val="1E2228"/>
-                </a:solidFill>
-              </a:defRPr>
-            </a:pPr>
-            <a:r>
-              <a:t>• Séparation des services + CI/CD amorcée démontrent la trajectoire cible.</a:t>
-            </a:r>
-          </a:p>
-          <a:p>
-            <a:pPr>
-              <a:spcAft>
-                <a:spcPts val="1200"/>
-              </a:spcAft>
-              <a:defRPr sz="2200">
-                <a:solidFill>
-                  <a:srgbClr val="1E2228"/>
-                </a:solidFill>
-              </a:defRPr>
-            </a:pPr>
-            <a:r>
-              <a:t>• Prochaine étape : validation DSI puis cadrage industrialisation.</a:t>
-            </a:r>
-          </a:p>
-        </p:txBody>
-      </p:sp>
-      <p:sp>
-        <p:nvSpPr>
-          <p:cNvPr id="8" name="TextBox 7"/>
-          <p:cNvSpPr txBox="1"/>
-          <p:nvPr/>
-        </p:nvSpPr>
-        <p:spPr>
-          <a:xfrm>
-            <a:off x="640080" y="6080760"/>
-            <a:ext cx="8046720" cy="365760"/>
-          </a:xfrm>
-          <a:prstGeom prst="rect">
-            <a:avLst/>
-          </a:prstGeom>
-          <a:noFill/>
-        </p:spPr>
-        <p:txBody>
-          <a:bodyPr wrap="none">
-            <a:spAutoFit/>
-          </a:bodyPr>
-          <a:lstStyle/>
-          <a:p>
-            <a:pPr>
-              <a:defRPr sz="1400">
-                <a:solidFill>
-                  <a:srgbClr val="767C88"/>
+              <a:defRPr sz="1300">
+                <a:solidFill>
+                  <a:srgbClr val="82788C"/>
                 </a:solidFill>
               </a:defRPr>
             </a:pPr>

</xml_diff>